<commit_message>
added new regression just on the most important features
</commit_message>
<xml_diff>
--- a/talk_layout_hong.pptx
+++ b/talk_layout_hong.pptx
@@ -22,8 +22,8 @@
     <p:sldId id="282" r:id="rId16"/>
     <p:sldId id="284" r:id="rId17"/>
     <p:sldId id="283" r:id="rId18"/>
-    <p:sldId id="285" r:id="rId19"/>
-    <p:sldId id="286" r:id="rId20"/>
+    <p:sldId id="286" r:id="rId19"/>
+    <p:sldId id="285" r:id="rId20"/>
     <p:sldId id="269" r:id="rId21"/>
   </p:sldIdLst>
   <p:sldSz cx="12192000" cy="6858000"/>
@@ -134,7 +134,7 @@
 <file path=ppt/revisionInfo.xml><?xml version="1.0" encoding="utf-8"?>
 <p1510:revInfo xmlns:a="http://schemas.openxmlformats.org/drawingml/2006/main" xmlns:r="http://schemas.openxmlformats.org/officeDocument/2006/relationships" xmlns:p1510="http://schemas.microsoft.com/office/powerpoint/2015/10/main">
   <p1510:revLst>
-    <p1510:client id="{2C96650F-A40B-4A21-BC0F-EB3A20D5A7BF}" v="624" dt="2020-11-25T02:27:35.810"/>
+    <p1510:client id="{2C96650F-A40B-4A21-BC0F-EB3A20D5A7BF}" v="627" dt="2020-11-25T15:13:43.545"/>
   </p1510:revLst>
 </p1510:revInfo>
 </file>
@@ -143,8 +143,8 @@
 <pc:chgInfo xmlns:a="http://schemas.openxmlformats.org/drawingml/2006/main" xmlns:r="http://schemas.openxmlformats.org/officeDocument/2006/relationships" xmlns:ac="http://schemas.microsoft.com/office/drawing/2013/main/command" xmlns:pc="http://schemas.microsoft.com/office/powerpoint/2013/main/command">
   <pc:docChgLst>
     <pc:chgData name="Hong Chan Kim" userId="e33419bb50987d15" providerId="LiveId" clId="{2C96650F-A40B-4A21-BC0F-EB3A20D5A7BF}"/>
-    <pc:docChg chg="undo redo custSel addSld delSld modSld">
-      <pc:chgData name="Hong Chan Kim" userId="e33419bb50987d15" providerId="LiveId" clId="{2C96650F-A40B-4A21-BC0F-EB3A20D5A7BF}" dt="2020-11-25T02:27:41.210" v="4121" actId="1076"/>
+    <pc:docChg chg="undo redo custSel addSld delSld modSld sldOrd">
+      <pc:chgData name="Hong Chan Kim" userId="e33419bb50987d15" providerId="LiveId" clId="{2C96650F-A40B-4A21-BC0F-EB3A20D5A7BF}" dt="2020-11-25T15:21:33.677" v="4127"/>
       <pc:docMkLst>
         <pc:docMk/>
       </pc:docMkLst>
@@ -1077,8 +1077,8 @@
           </ac:spMkLst>
         </pc:spChg>
       </pc:sldChg>
-      <pc:sldChg chg="modSp add mod">
-        <pc:chgData name="Hong Chan Kim" userId="e33419bb50987d15" providerId="LiveId" clId="{2C96650F-A40B-4A21-BC0F-EB3A20D5A7BF}" dt="2020-11-25T02:27:41.210" v="4121" actId="1076"/>
+      <pc:sldChg chg="modSp add mod ord">
+        <pc:chgData name="Hong Chan Kim" userId="e33419bb50987d15" providerId="LiveId" clId="{2C96650F-A40B-4A21-BC0F-EB3A20D5A7BF}" dt="2020-11-25T15:21:33.677" v="4127"/>
         <pc:sldMkLst>
           <pc:docMk/>
           <pc:sldMk cId="2716920455" sldId="286"/>
@@ -1091,6 +1091,20 @@
             <ac:spMk id="3" creationId="{86E7690B-A2DB-4067-94E6-6734F12FB3FA}"/>
           </ac:spMkLst>
         </pc:spChg>
+      </pc:sldChg>
+      <pc:sldChg chg="add del">
+        <pc:chgData name="Hong Chan Kim" userId="e33419bb50987d15" providerId="LiveId" clId="{2C96650F-A40B-4A21-BC0F-EB3A20D5A7BF}" dt="2020-11-25T15:13:45.784" v="4125" actId="47"/>
+        <pc:sldMkLst>
+          <pc:docMk/>
+          <pc:sldMk cId="44404388" sldId="287"/>
+        </pc:sldMkLst>
+      </pc:sldChg>
+      <pc:sldChg chg="add del">
+        <pc:chgData name="Hong Chan Kim" userId="e33419bb50987d15" providerId="LiveId" clId="{2C96650F-A40B-4A21-BC0F-EB3A20D5A7BF}" dt="2020-11-25T15:13:16.600" v="4123"/>
+        <pc:sldMkLst>
+          <pc:docMk/>
+          <pc:sldMk cId="2143406124" sldId="287"/>
+        </pc:sldMkLst>
       </pc:sldChg>
     </pc:docChg>
   </pc:docChgLst>
@@ -1342,7 +1356,7 @@
           <a:p>
             <a:fld id="{AD23DEA3-59F2-D248-B8A1-8A241FECEB62}" type="datetimeFigureOut">
               <a:rPr lang="en-US" smtClean="0"/>
-              <a:t>11/24/2020</a:t>
+              <a:t>11/25/2020</a:t>
             </a:fld>
             <a:endParaRPr lang="en-US"/>
           </a:p>
@@ -1604,7 +1618,7 @@
           <a:p>
             <a:fld id="{AD23DEA3-59F2-D248-B8A1-8A241FECEB62}" type="datetimeFigureOut">
               <a:rPr lang="en-US" smtClean="0"/>
-              <a:t>11/24/2020</a:t>
+              <a:t>11/25/2020</a:t>
             </a:fld>
             <a:endParaRPr lang="en-US"/>
           </a:p>
@@ -1839,7 +1853,7 @@
           <a:p>
             <a:fld id="{AD23DEA3-59F2-D248-B8A1-8A241FECEB62}" type="datetimeFigureOut">
               <a:rPr lang="en-US" smtClean="0"/>
-              <a:t>11/24/2020</a:t>
+              <a:t>11/25/2020</a:t>
             </a:fld>
             <a:endParaRPr lang="en-US"/>
           </a:p>
@@ -2079,7 +2093,7 @@
           <a:p>
             <a:fld id="{AD23DEA3-59F2-D248-B8A1-8A241FECEB62}" type="datetimeFigureOut">
               <a:rPr lang="en-US" smtClean="0"/>
-              <a:t>11/24/2020</a:t>
+              <a:t>11/25/2020</a:t>
             </a:fld>
             <a:endParaRPr lang="en-US"/>
           </a:p>
@@ -2386,7 +2400,7 @@
           <a:p>
             <a:fld id="{AD23DEA3-59F2-D248-B8A1-8A241FECEB62}" type="datetimeFigureOut">
               <a:rPr lang="en-US" smtClean="0"/>
-              <a:t>11/24/2020</a:t>
+              <a:t>11/25/2020</a:t>
             </a:fld>
             <a:endParaRPr lang="en-US"/>
           </a:p>
@@ -2688,7 +2702,7 @@
           <a:p>
             <a:fld id="{AD23DEA3-59F2-D248-B8A1-8A241FECEB62}" type="datetimeFigureOut">
               <a:rPr lang="en-US" smtClean="0"/>
-              <a:t>11/24/2020</a:t>
+              <a:t>11/25/2020</a:t>
             </a:fld>
             <a:endParaRPr lang="en-US"/>
           </a:p>
@@ -3110,7 +3124,7 @@
           <a:p>
             <a:fld id="{AD23DEA3-59F2-D248-B8A1-8A241FECEB62}" type="datetimeFigureOut">
               <a:rPr lang="en-US" smtClean="0"/>
-              <a:t>11/24/2020</a:t>
+              <a:t>11/25/2020</a:t>
             </a:fld>
             <a:endParaRPr lang="en-US"/>
           </a:p>
@@ -3272,7 +3286,7 @@
           <a:p>
             <a:fld id="{AD23DEA3-59F2-D248-B8A1-8A241FECEB62}" type="datetimeFigureOut">
               <a:rPr lang="en-US" smtClean="0"/>
-              <a:t>11/24/2020</a:t>
+              <a:t>11/25/2020</a:t>
             </a:fld>
             <a:endParaRPr lang="en-US"/>
           </a:p>
@@ -3367,7 +3381,7 @@
           <a:p>
             <a:fld id="{AD23DEA3-59F2-D248-B8A1-8A241FECEB62}" type="datetimeFigureOut">
               <a:rPr lang="en-US" smtClean="0"/>
-              <a:t>11/24/2020</a:t>
+              <a:t>11/25/2020</a:t>
             </a:fld>
             <a:endParaRPr lang="en-US"/>
           </a:p>
@@ -3745,7 +3759,7 @@
           <a:p>
             <a:fld id="{AD23DEA3-59F2-D248-B8A1-8A241FECEB62}" type="datetimeFigureOut">
               <a:rPr lang="en-US" smtClean="0"/>
-              <a:t>11/24/2020</a:t>
+              <a:t>11/25/2020</a:t>
             </a:fld>
             <a:endParaRPr lang="en-US"/>
           </a:p>
@@ -4034,7 +4048,7 @@
           <a:p>
             <a:fld id="{AD23DEA3-59F2-D248-B8A1-8A241FECEB62}" type="datetimeFigureOut">
               <a:rPr lang="en-US" smtClean="0"/>
-              <a:t>11/24/2020</a:t>
+              <a:t>11/25/2020</a:t>
             </a:fld>
             <a:endParaRPr lang="en-US"/>
           </a:p>
@@ -4245,7 +4259,7 @@
           <a:p>
             <a:fld id="{AD23DEA3-59F2-D248-B8A1-8A241FECEB62}" type="datetimeFigureOut">
               <a:rPr lang="en-US" smtClean="0"/>
-              <a:t>11/24/2020</a:t>
+              <a:t>11/25/2020</a:t>
             </a:fld>
             <a:endParaRPr lang="en-US"/>
           </a:p>
@@ -7401,8 +7415,8 @@
           </a:p>
         </p:txBody>
       </p:sp>
-      <mc:AlternateContent xmlns:mc="http://schemas.openxmlformats.org/markup-compatibility/2006">
-        <mc:Choice xmlns:a14="http://schemas.microsoft.com/office/drawing/2010/main" Requires="a14">
+      <mc:AlternateContent xmlns:mc="http://schemas.openxmlformats.org/markup-compatibility/2006" xmlns:a14="http://schemas.microsoft.com/office/drawing/2010/main">
+        <mc:Choice Requires="a14">
           <p:sp>
             <p:nvSpPr>
               <p:cNvPr id="7" name="TextBox 6">
@@ -7967,7 +7981,7 @@
             </p:txBody>
           </p:sp>
         </mc:Choice>
-        <mc:Fallback>
+        <mc:Fallback xmlns="">
           <p:sp>
             <p:nvSpPr>
               <p:cNvPr id="7" name="TextBox 6">
@@ -8108,8 +8122,8 @@
         </p:nvSpPr>
         <p:spPr>
           <a:xfrm>
-            <a:off x="3048402" y="680813"/>
-            <a:ext cx="6095195" cy="646331"/>
+            <a:off x="2728604" y="680813"/>
+            <a:ext cx="6734792" cy="646331"/>
           </a:xfrm>
           <a:prstGeom prst="rect">
             <a:avLst/>
@@ -8124,7 +8138,7 @@
           <a:p>
             <a:r>
               <a:rPr lang="en-US" sz="3600" dirty="0"/>
-              <a:t>Features That Can Be Improved</a:t>
+              <a:t>Features That Cannot Be Improved</a:t>
             </a:r>
           </a:p>
         </p:txBody>
@@ -8132,7 +8146,7 @@
     </p:spTree>
     <p:extLst>
       <p:ext uri="{BB962C8B-B14F-4D97-AF65-F5344CB8AC3E}">
-        <p14:creationId xmlns:p14="http://schemas.microsoft.com/office/powerpoint/2010/main" val="2445888909"/>
+        <p14:creationId xmlns:p14="http://schemas.microsoft.com/office/powerpoint/2010/main" val="2716920455"/>
       </p:ext>
     </p:extLst>
   </p:cSld>
@@ -8225,8 +8239,8 @@
         </p:nvSpPr>
         <p:spPr>
           <a:xfrm>
-            <a:off x="2728604" y="680813"/>
-            <a:ext cx="6734792" cy="646331"/>
+            <a:off x="3048402" y="680813"/>
+            <a:ext cx="6095195" cy="646331"/>
           </a:xfrm>
           <a:prstGeom prst="rect">
             <a:avLst/>
@@ -8241,7 +8255,7 @@
           <a:p>
             <a:r>
               <a:rPr lang="en-US" sz="3600" dirty="0"/>
-              <a:t>Features That Cannot Be Improved</a:t>
+              <a:t>Features That Can Be Improved</a:t>
             </a:r>
           </a:p>
         </p:txBody>
@@ -8249,7 +8263,7 @@
     </p:spTree>
     <p:extLst>
       <p:ext uri="{BB962C8B-B14F-4D97-AF65-F5344CB8AC3E}">
-        <p14:creationId xmlns:p14="http://schemas.microsoft.com/office/powerpoint/2010/main" val="2716920455"/>
+        <p14:creationId xmlns:p14="http://schemas.microsoft.com/office/powerpoint/2010/main" val="2445888909"/>
       </p:ext>
     </p:extLst>
   </p:cSld>

</xml_diff>